<commit_message>
Added a column to team members table
</commit_message>
<xml_diff>
--- a/2.2PSS_ Python Functions.pptx
+++ b/2.2PSS_ Python Functions.pptx
@@ -862,7 +862,7 @@
         </p:nvSpPr>
         <p:spPr>
           <a:xfrm>
-            <a:off x="381300" y="685800"/>
+            <a:off x="381000" y="685800"/>
             <a:ext cx="6096000" cy="3429000"/>
           </a:xfrm>
           <a:custGeom>
@@ -8968,11 +8968,17 @@
         <p:nvGraphicFramePr>
           <p:cNvPr id="81" name="Google Shape;81;p14"/>
           <p:cNvGraphicFramePr/>
-          <p:nvPr/>
+          <p:nvPr>
+            <p:extLst>
+              <p:ext uri="{D42A27DB-BD31-4B8C-83A1-F6EECF244321}">
+                <p14:modId xmlns:p14="http://schemas.microsoft.com/office/powerpoint/2010/main" val="628445653"/>
+              </p:ext>
+            </p:extLst>
+          </p:nvPr>
         </p:nvGraphicFramePr>
         <p:xfrm>
           <a:off x="4665300" y="1445175"/>
-          <a:ext cx="3999900" cy="3467050"/>
+          <a:ext cx="3999900" cy="3719730"/>
         </p:xfrm>
         <a:graphic>
           <a:graphicData uri="http://schemas.openxmlformats.org/drawingml/2006/table">
@@ -8982,10 +8988,17 @@
                 <a:tableStyleId>{AA3F7AD9-4F41-45E3-92D7-E95E2AC3C767}</a:tableStyleId>
               </a:tblPr>
               <a:tblGrid>
-                <a:gridCol w="3999900">
+                <a:gridCol w="2616528">
                   <a:extLst>
                     <a:ext uri="{9D8B030D-6E8A-4147-A177-3AD203B41FA5}">
                       <a16:colId xmlns:a16="http://schemas.microsoft.com/office/drawing/2014/main" val="20000"/>
+                    </a:ext>
+                  </a:extLst>
+                </a:gridCol>
+                <a:gridCol w="1383372">
+                  <a:extLst>
+                    <a:ext uri="{9D8B030D-6E8A-4147-A177-3AD203B41FA5}">
+                      <a16:colId xmlns:a16="http://schemas.microsoft.com/office/drawing/2014/main" val="2044309761"/>
                     </a:ext>
                   </a:extLst>
                 </a:gridCol>
@@ -9005,7 +9018,11 @@
                         </a:spcAft>
                         <a:buNone/>
                       </a:pPr>
-                      <a:endParaRPr/>
+                      <a:r>
+                        <a:rPr lang="en-US" dirty="0"/>
+                        <a:t>Team Member Name</a:t>
+                      </a:r>
+                      <a:endParaRPr dirty="0"/>
                     </a:p>
                   </a:txBody>
                   <a:tcPr marL="91425" marR="91425" marT="91425" marB="91425">
@@ -9018,7 +9035,7 @@
                       <a:headEnd type="none" w="sm" len="sm"/>
                       <a:tailEnd type="none" w="sm" len="sm"/>
                     </a:lnL>
-                    <a:lnR w="19050" cap="flat" cmpd="sng">
+                    <a:lnR w="19050" cap="flat" cmpd="sng" algn="ctr">
                       <a:solidFill>
                         <a:srgbClr val="434343"/>
                       </a:solidFill>
@@ -9037,6 +9054,70 @@
                       <a:tailEnd type="none" w="sm" len="sm"/>
                     </a:lnT>
                     <a:lnB w="19050" cap="flat" cmpd="sng">
+                      <a:solidFill>
+                        <a:srgbClr val="434343"/>
+                      </a:solidFill>
+                      <a:prstDash val="solid"/>
+                      <a:round/>
+                      <a:headEnd type="none" w="sm" len="sm"/>
+                      <a:tailEnd type="none" w="sm" len="sm"/>
+                    </a:lnB>
+                  </a:tcPr>
+                </a:tc>
+                <a:tc>
+                  <a:txBody>
+                    <a:bodyPr/>
+                    <a:lstStyle/>
+                    <a:p>
+                      <a:pPr marL="0" lvl="0" indent="0" algn="l" rtl="0">
+                        <a:spcBef>
+                          <a:spcPts val="0"/>
+                        </a:spcBef>
+                        <a:spcAft>
+                          <a:spcPts val="0"/>
+                        </a:spcAft>
+                        <a:buNone/>
+                      </a:pPr>
+                      <a:r>
+                        <a:rPr lang="en-US" dirty="0"/>
+                        <a:t>Check if did </a:t>
+                      </a:r>
+                      <a:r>
+                        <a:rPr lang="en-US" u="sng" dirty="0"/>
+                        <a:t>not do anything</a:t>
+                      </a:r>
+                      <a:endParaRPr u="sng" dirty="0"/>
+                    </a:p>
+                  </a:txBody>
+                  <a:tcPr marL="91425" marR="91425" marT="91425" marB="91425">
+                    <a:lnL w="19050" cap="flat" cmpd="sng" algn="ctr">
+                      <a:solidFill>
+                        <a:srgbClr val="434343"/>
+                      </a:solidFill>
+                      <a:prstDash val="solid"/>
+                      <a:round/>
+                      <a:headEnd type="none" w="sm" len="sm"/>
+                      <a:tailEnd type="none" w="sm" len="sm"/>
+                    </a:lnL>
+                    <a:lnR w="19050" cap="flat" cmpd="sng">
+                      <a:solidFill>
+                        <a:srgbClr val="434343"/>
+                      </a:solidFill>
+                      <a:prstDash val="solid"/>
+                      <a:round/>
+                      <a:headEnd type="none" w="sm" len="sm"/>
+                      <a:tailEnd type="none" w="sm" len="sm"/>
+                    </a:lnR>
+                    <a:lnT w="19050" cap="flat" cmpd="sng" algn="ctr">
+                      <a:solidFill>
+                        <a:srgbClr val="434343"/>
+                      </a:solidFill>
+                      <a:prstDash val="solid"/>
+                      <a:round/>
+                      <a:headEnd type="none" w="sm" len="sm"/>
+                      <a:tailEnd type="none" w="sm" len="sm"/>
+                    </a:lnT>
+                    <a:lnB w="19050" cap="flat" cmpd="sng" algn="ctr">
                       <a:solidFill>
                         <a:srgbClr val="434343"/>
                       </a:solidFill>
@@ -9068,7 +9149,7 @@
                         </a:spcAft>
                         <a:buNone/>
                       </a:pPr>
-                      <a:endParaRPr/>
+                      <a:endParaRPr dirty="0"/>
                     </a:p>
                   </a:txBody>
                   <a:tcPr marL="91425" marR="91425" marT="91425" marB="91425">
@@ -9081,7 +9162,7 @@
                       <a:headEnd type="none" w="sm" len="sm"/>
                       <a:tailEnd type="none" w="sm" len="sm"/>
                     </a:lnL>
-                    <a:lnR w="19050" cap="flat" cmpd="sng">
+                    <a:lnR w="19050" cap="flat" cmpd="sng" algn="ctr">
                       <a:solidFill>
                         <a:srgbClr val="434343"/>
                       </a:solidFill>
@@ -9100,6 +9181,62 @@
                       <a:tailEnd type="none" w="sm" len="sm"/>
                     </a:lnT>
                     <a:lnB w="19050" cap="flat" cmpd="sng">
+                      <a:solidFill>
+                        <a:srgbClr val="434343"/>
+                      </a:solidFill>
+                      <a:prstDash val="solid"/>
+                      <a:round/>
+                      <a:headEnd type="none" w="sm" len="sm"/>
+                      <a:tailEnd type="none" w="sm" len="sm"/>
+                    </a:lnB>
+                  </a:tcPr>
+                </a:tc>
+                <a:tc>
+                  <a:txBody>
+                    <a:bodyPr/>
+                    <a:lstStyle/>
+                    <a:p>
+                      <a:pPr marL="0" lvl="0" indent="0" algn="l" rtl="0">
+                        <a:spcBef>
+                          <a:spcPts val="0"/>
+                        </a:spcBef>
+                        <a:spcAft>
+                          <a:spcPts val="0"/>
+                        </a:spcAft>
+                        <a:buNone/>
+                      </a:pPr>
+                      <a:endParaRPr dirty="0"/>
+                    </a:p>
+                  </a:txBody>
+                  <a:tcPr marL="91425" marR="91425" marT="91425" marB="91425">
+                    <a:lnL w="19050" cap="flat" cmpd="sng" algn="ctr">
+                      <a:solidFill>
+                        <a:srgbClr val="434343"/>
+                      </a:solidFill>
+                      <a:prstDash val="solid"/>
+                      <a:round/>
+                      <a:headEnd type="none" w="sm" len="sm"/>
+                      <a:tailEnd type="none" w="sm" len="sm"/>
+                    </a:lnL>
+                    <a:lnR w="19050" cap="flat" cmpd="sng">
+                      <a:solidFill>
+                        <a:srgbClr val="434343"/>
+                      </a:solidFill>
+                      <a:prstDash val="solid"/>
+                      <a:round/>
+                      <a:headEnd type="none" w="sm" len="sm"/>
+                      <a:tailEnd type="none" w="sm" len="sm"/>
+                    </a:lnR>
+                    <a:lnT w="19050" cap="flat" cmpd="sng" algn="ctr">
+                      <a:solidFill>
+                        <a:srgbClr val="434343"/>
+                      </a:solidFill>
+                      <a:prstDash val="solid"/>
+                      <a:round/>
+                      <a:headEnd type="none" w="sm" len="sm"/>
+                      <a:tailEnd type="none" w="sm" len="sm"/>
+                    </a:lnT>
+                    <a:lnB w="19050" cap="flat" cmpd="sng" algn="ctr">
                       <a:solidFill>
                         <a:srgbClr val="434343"/>
                       </a:solidFill>
@@ -9131,7 +9268,7 @@
                         </a:spcAft>
                         <a:buNone/>
                       </a:pPr>
-                      <a:endParaRPr/>
+                      <a:endParaRPr dirty="0"/>
                     </a:p>
                   </a:txBody>
                   <a:tcPr marL="91425" marR="91425" marT="91425" marB="91425">
@@ -9144,7 +9281,7 @@
                       <a:headEnd type="none" w="sm" len="sm"/>
                       <a:tailEnd type="none" w="sm" len="sm"/>
                     </a:lnL>
-                    <a:lnR w="19050" cap="flat" cmpd="sng">
+                    <a:lnR w="19050" cap="flat" cmpd="sng" algn="ctr">
                       <a:solidFill>
                         <a:srgbClr val="434343"/>
                       </a:solidFill>
@@ -9163,6 +9300,62 @@
                       <a:tailEnd type="none" w="sm" len="sm"/>
                     </a:lnT>
                     <a:lnB w="19050" cap="flat" cmpd="sng">
+                      <a:solidFill>
+                        <a:srgbClr val="434343"/>
+                      </a:solidFill>
+                      <a:prstDash val="solid"/>
+                      <a:round/>
+                      <a:headEnd type="none" w="sm" len="sm"/>
+                      <a:tailEnd type="none" w="sm" len="sm"/>
+                    </a:lnB>
+                  </a:tcPr>
+                </a:tc>
+                <a:tc>
+                  <a:txBody>
+                    <a:bodyPr/>
+                    <a:lstStyle/>
+                    <a:p>
+                      <a:pPr marL="0" lvl="0" indent="0" algn="l" rtl="0">
+                        <a:spcBef>
+                          <a:spcPts val="0"/>
+                        </a:spcBef>
+                        <a:spcAft>
+                          <a:spcPts val="0"/>
+                        </a:spcAft>
+                        <a:buNone/>
+                      </a:pPr>
+                      <a:endParaRPr dirty="0"/>
+                    </a:p>
+                  </a:txBody>
+                  <a:tcPr marL="91425" marR="91425" marT="91425" marB="91425">
+                    <a:lnL w="19050" cap="flat" cmpd="sng" algn="ctr">
+                      <a:solidFill>
+                        <a:srgbClr val="434343"/>
+                      </a:solidFill>
+                      <a:prstDash val="solid"/>
+                      <a:round/>
+                      <a:headEnd type="none" w="sm" len="sm"/>
+                      <a:tailEnd type="none" w="sm" len="sm"/>
+                    </a:lnL>
+                    <a:lnR w="19050" cap="flat" cmpd="sng">
+                      <a:solidFill>
+                        <a:srgbClr val="434343"/>
+                      </a:solidFill>
+                      <a:prstDash val="solid"/>
+                      <a:round/>
+                      <a:headEnd type="none" w="sm" len="sm"/>
+                      <a:tailEnd type="none" w="sm" len="sm"/>
+                    </a:lnR>
+                    <a:lnT w="19050" cap="flat" cmpd="sng" algn="ctr">
+                      <a:solidFill>
+                        <a:srgbClr val="434343"/>
+                      </a:solidFill>
+                      <a:prstDash val="solid"/>
+                      <a:round/>
+                      <a:headEnd type="none" w="sm" len="sm"/>
+                      <a:tailEnd type="none" w="sm" len="sm"/>
+                    </a:lnT>
+                    <a:lnB w="19050" cap="flat" cmpd="sng" algn="ctr">
                       <a:solidFill>
                         <a:srgbClr val="434343"/>
                       </a:solidFill>
@@ -9194,7 +9387,7 @@
                         </a:spcAft>
                         <a:buNone/>
                       </a:pPr>
-                      <a:endParaRPr/>
+                      <a:endParaRPr dirty="0"/>
                     </a:p>
                   </a:txBody>
                   <a:tcPr marL="91425" marR="91425" marT="91425" marB="91425">
@@ -9207,7 +9400,7 @@
                       <a:headEnd type="none" w="sm" len="sm"/>
                       <a:tailEnd type="none" w="sm" len="sm"/>
                     </a:lnL>
-                    <a:lnR w="19050" cap="flat" cmpd="sng">
+                    <a:lnR w="19050" cap="flat" cmpd="sng" algn="ctr">
                       <a:solidFill>
                         <a:srgbClr val="434343"/>
                       </a:solidFill>
@@ -9226,6 +9419,62 @@
                       <a:tailEnd type="none" w="sm" len="sm"/>
                     </a:lnT>
                     <a:lnB w="19050" cap="flat" cmpd="sng">
+                      <a:solidFill>
+                        <a:srgbClr val="434343"/>
+                      </a:solidFill>
+                      <a:prstDash val="solid"/>
+                      <a:round/>
+                      <a:headEnd type="none" w="sm" len="sm"/>
+                      <a:tailEnd type="none" w="sm" len="sm"/>
+                    </a:lnB>
+                  </a:tcPr>
+                </a:tc>
+                <a:tc>
+                  <a:txBody>
+                    <a:bodyPr/>
+                    <a:lstStyle/>
+                    <a:p>
+                      <a:pPr marL="0" lvl="0" indent="0" algn="l" rtl="0">
+                        <a:spcBef>
+                          <a:spcPts val="0"/>
+                        </a:spcBef>
+                        <a:spcAft>
+                          <a:spcPts val="0"/>
+                        </a:spcAft>
+                        <a:buNone/>
+                      </a:pPr>
+                      <a:endParaRPr dirty="0"/>
+                    </a:p>
+                  </a:txBody>
+                  <a:tcPr marL="91425" marR="91425" marT="91425" marB="91425">
+                    <a:lnL w="19050" cap="flat" cmpd="sng" algn="ctr">
+                      <a:solidFill>
+                        <a:srgbClr val="434343"/>
+                      </a:solidFill>
+                      <a:prstDash val="solid"/>
+                      <a:round/>
+                      <a:headEnd type="none" w="sm" len="sm"/>
+                      <a:tailEnd type="none" w="sm" len="sm"/>
+                    </a:lnL>
+                    <a:lnR w="19050" cap="flat" cmpd="sng">
+                      <a:solidFill>
+                        <a:srgbClr val="434343"/>
+                      </a:solidFill>
+                      <a:prstDash val="solid"/>
+                      <a:round/>
+                      <a:headEnd type="none" w="sm" len="sm"/>
+                      <a:tailEnd type="none" w="sm" len="sm"/>
+                    </a:lnR>
+                    <a:lnT w="19050" cap="flat" cmpd="sng" algn="ctr">
+                      <a:solidFill>
+                        <a:srgbClr val="434343"/>
+                      </a:solidFill>
+                      <a:prstDash val="solid"/>
+                      <a:round/>
+                      <a:headEnd type="none" w="sm" len="sm"/>
+                      <a:tailEnd type="none" w="sm" len="sm"/>
+                    </a:lnT>
+                    <a:lnB w="19050" cap="flat" cmpd="sng" algn="ctr">
                       <a:solidFill>
                         <a:srgbClr val="434343"/>
                       </a:solidFill>
@@ -9257,7 +9506,7 @@
                         </a:spcAft>
                         <a:buNone/>
                       </a:pPr>
-                      <a:endParaRPr/>
+                      <a:endParaRPr dirty="0"/>
                     </a:p>
                   </a:txBody>
                   <a:tcPr marL="91425" marR="91425" marT="91425" marB="91425">
@@ -9270,7 +9519,7 @@
                       <a:headEnd type="none" w="sm" len="sm"/>
                       <a:tailEnd type="none" w="sm" len="sm"/>
                     </a:lnL>
-                    <a:lnR w="19050" cap="flat" cmpd="sng">
+                    <a:lnR w="19050" cap="flat" cmpd="sng" algn="ctr">
                       <a:solidFill>
                         <a:srgbClr val="434343"/>
                       </a:solidFill>
@@ -9289,6 +9538,62 @@
                       <a:tailEnd type="none" w="sm" len="sm"/>
                     </a:lnT>
                     <a:lnB w="19050" cap="flat" cmpd="sng">
+                      <a:solidFill>
+                        <a:srgbClr val="434343"/>
+                      </a:solidFill>
+                      <a:prstDash val="solid"/>
+                      <a:round/>
+                      <a:headEnd type="none" w="sm" len="sm"/>
+                      <a:tailEnd type="none" w="sm" len="sm"/>
+                    </a:lnB>
+                  </a:tcPr>
+                </a:tc>
+                <a:tc>
+                  <a:txBody>
+                    <a:bodyPr/>
+                    <a:lstStyle/>
+                    <a:p>
+                      <a:pPr marL="0" lvl="0" indent="0" algn="l" rtl="0">
+                        <a:spcBef>
+                          <a:spcPts val="0"/>
+                        </a:spcBef>
+                        <a:spcAft>
+                          <a:spcPts val="0"/>
+                        </a:spcAft>
+                        <a:buNone/>
+                      </a:pPr>
+                      <a:endParaRPr dirty="0"/>
+                    </a:p>
+                  </a:txBody>
+                  <a:tcPr marL="91425" marR="91425" marT="91425" marB="91425">
+                    <a:lnL w="19050" cap="flat" cmpd="sng" algn="ctr">
+                      <a:solidFill>
+                        <a:srgbClr val="434343"/>
+                      </a:solidFill>
+                      <a:prstDash val="solid"/>
+                      <a:round/>
+                      <a:headEnd type="none" w="sm" len="sm"/>
+                      <a:tailEnd type="none" w="sm" len="sm"/>
+                    </a:lnL>
+                    <a:lnR w="19050" cap="flat" cmpd="sng">
+                      <a:solidFill>
+                        <a:srgbClr val="434343"/>
+                      </a:solidFill>
+                      <a:prstDash val="solid"/>
+                      <a:round/>
+                      <a:headEnd type="none" w="sm" len="sm"/>
+                      <a:tailEnd type="none" w="sm" len="sm"/>
+                    </a:lnR>
+                    <a:lnT w="19050" cap="flat" cmpd="sng" algn="ctr">
+                      <a:solidFill>
+                        <a:srgbClr val="434343"/>
+                      </a:solidFill>
+                      <a:prstDash val="solid"/>
+                      <a:round/>
+                      <a:headEnd type="none" w="sm" len="sm"/>
+                      <a:tailEnd type="none" w="sm" len="sm"/>
+                    </a:lnT>
+                    <a:lnB w="19050" cap="flat" cmpd="sng" algn="ctr">
                       <a:solidFill>
                         <a:srgbClr val="434343"/>
                       </a:solidFill>
@@ -9320,7 +9625,7 @@
                         </a:spcAft>
                         <a:buNone/>
                       </a:pPr>
-                      <a:endParaRPr/>
+                      <a:endParaRPr dirty="0"/>
                     </a:p>
                   </a:txBody>
                   <a:tcPr marL="91425" marR="91425" marT="91425" marB="91425">
@@ -9333,7 +9638,7 @@
                       <a:headEnd type="none" w="sm" len="sm"/>
                       <a:tailEnd type="none" w="sm" len="sm"/>
                     </a:lnL>
-                    <a:lnR w="19050" cap="flat" cmpd="sng">
+                    <a:lnR w="19050" cap="flat" cmpd="sng" algn="ctr">
                       <a:solidFill>
                         <a:srgbClr val="434343"/>
                       </a:solidFill>
@@ -9352,6 +9657,62 @@
                       <a:tailEnd type="none" w="sm" len="sm"/>
                     </a:lnT>
                     <a:lnB w="19050" cap="flat" cmpd="sng">
+                      <a:solidFill>
+                        <a:srgbClr val="434343"/>
+                      </a:solidFill>
+                      <a:prstDash val="solid"/>
+                      <a:round/>
+                      <a:headEnd type="none" w="sm" len="sm"/>
+                      <a:tailEnd type="none" w="sm" len="sm"/>
+                    </a:lnB>
+                  </a:tcPr>
+                </a:tc>
+                <a:tc>
+                  <a:txBody>
+                    <a:bodyPr/>
+                    <a:lstStyle/>
+                    <a:p>
+                      <a:pPr marL="0" lvl="0" indent="0" algn="l" rtl="0">
+                        <a:spcBef>
+                          <a:spcPts val="0"/>
+                        </a:spcBef>
+                        <a:spcAft>
+                          <a:spcPts val="0"/>
+                        </a:spcAft>
+                        <a:buNone/>
+                      </a:pPr>
+                      <a:endParaRPr dirty="0"/>
+                    </a:p>
+                  </a:txBody>
+                  <a:tcPr marL="91425" marR="91425" marT="91425" marB="91425">
+                    <a:lnL w="19050" cap="flat" cmpd="sng" algn="ctr">
+                      <a:solidFill>
+                        <a:srgbClr val="434343"/>
+                      </a:solidFill>
+                      <a:prstDash val="solid"/>
+                      <a:round/>
+                      <a:headEnd type="none" w="sm" len="sm"/>
+                      <a:tailEnd type="none" w="sm" len="sm"/>
+                    </a:lnL>
+                    <a:lnR w="19050" cap="flat" cmpd="sng">
+                      <a:solidFill>
+                        <a:srgbClr val="434343"/>
+                      </a:solidFill>
+                      <a:prstDash val="solid"/>
+                      <a:round/>
+                      <a:headEnd type="none" w="sm" len="sm"/>
+                      <a:tailEnd type="none" w="sm" len="sm"/>
+                    </a:lnR>
+                    <a:lnT w="19050" cap="flat" cmpd="sng" algn="ctr">
+                      <a:solidFill>
+                        <a:srgbClr val="434343"/>
+                      </a:solidFill>
+                      <a:prstDash val="solid"/>
+                      <a:round/>
+                      <a:headEnd type="none" w="sm" len="sm"/>
+                      <a:tailEnd type="none" w="sm" len="sm"/>
+                    </a:lnT>
+                    <a:lnB w="19050" cap="flat" cmpd="sng" algn="ctr">
                       <a:solidFill>
                         <a:srgbClr val="434343"/>
                       </a:solidFill>

</xml_diff>